<commit_message>
Adding slides for Licenses and How to contribute
</commit_message>
<xml_diff>
--- a/notes/Lecture_05.pptx
+++ b/notes/Lecture_05.pptx
@@ -6,35 +6,36 @@
     <p:sldMasterId id="2147483801" r:id="rId2"/>
   </p:sldMasterIdLst>
   <p:notesMasterIdLst>
-    <p:notesMasterId r:id="rId26"/>
+    <p:notesMasterId r:id="rId27"/>
   </p:notesMasterIdLst>
   <p:handoutMasterIdLst>
-    <p:handoutMasterId r:id="rId27"/>
+    <p:handoutMasterId r:id="rId28"/>
   </p:handoutMasterIdLst>
   <p:sldIdLst>
     <p:sldId id="256" r:id="rId3"/>
     <p:sldId id="319" r:id="rId4"/>
-    <p:sldId id="298" r:id="rId5"/>
-    <p:sldId id="299" r:id="rId6"/>
-    <p:sldId id="300" r:id="rId7"/>
-    <p:sldId id="302" r:id="rId8"/>
-    <p:sldId id="301" r:id="rId9"/>
-    <p:sldId id="303" r:id="rId10"/>
-    <p:sldId id="304" r:id="rId11"/>
-    <p:sldId id="305" r:id="rId12"/>
-    <p:sldId id="306" r:id="rId13"/>
-    <p:sldId id="307" r:id="rId14"/>
-    <p:sldId id="308" r:id="rId15"/>
-    <p:sldId id="309" r:id="rId16"/>
-    <p:sldId id="315" r:id="rId17"/>
-    <p:sldId id="310" r:id="rId18"/>
-    <p:sldId id="311" r:id="rId19"/>
-    <p:sldId id="312" r:id="rId20"/>
-    <p:sldId id="313" r:id="rId21"/>
-    <p:sldId id="314" r:id="rId22"/>
-    <p:sldId id="317" r:id="rId23"/>
-    <p:sldId id="316" r:id="rId24"/>
-    <p:sldId id="318" r:id="rId25"/>
+    <p:sldId id="320" r:id="rId5"/>
+    <p:sldId id="298" r:id="rId6"/>
+    <p:sldId id="299" r:id="rId7"/>
+    <p:sldId id="300" r:id="rId8"/>
+    <p:sldId id="302" r:id="rId9"/>
+    <p:sldId id="301" r:id="rId10"/>
+    <p:sldId id="303" r:id="rId11"/>
+    <p:sldId id="304" r:id="rId12"/>
+    <p:sldId id="305" r:id="rId13"/>
+    <p:sldId id="306" r:id="rId14"/>
+    <p:sldId id="307" r:id="rId15"/>
+    <p:sldId id="308" r:id="rId16"/>
+    <p:sldId id="309" r:id="rId17"/>
+    <p:sldId id="315" r:id="rId18"/>
+    <p:sldId id="310" r:id="rId19"/>
+    <p:sldId id="311" r:id="rId20"/>
+    <p:sldId id="312" r:id="rId21"/>
+    <p:sldId id="313" r:id="rId22"/>
+    <p:sldId id="314" r:id="rId23"/>
+    <p:sldId id="317" r:id="rId24"/>
+    <p:sldId id="316" r:id="rId25"/>
+    <p:sldId id="318" r:id="rId26"/>
   </p:sldIdLst>
   <p:sldSz cx="12192000" cy="6858000"/>
   <p:notesSz cx="7010400" cy="9296400"/>
@@ -42415,7 +42416,7 @@
           <a:p>
             <a:fld id="{023309ED-A3F5-1148-A338-EFA8C9AAB689}" type="datetimeFigureOut">
               <a:rPr lang="en-US" smtClean="0"/>
-              <a:t>2/15/23</a:t>
+              <a:t>2/17/23</a:t>
             </a:fld>
             <a:endParaRPr lang="en-US"/>
           </a:p>
@@ -45690,6 +45691,151 @@
           <p:cNvPr id="2" name="Title 1">
             <a:extLst>
               <a:ext uri="{FF2B5EF4-FFF2-40B4-BE49-F238E27FC236}">
+                <a16:creationId xmlns:a16="http://schemas.microsoft.com/office/drawing/2014/main" id="{E93B121F-724A-4944-8363-D9A4D3591054}"/>
+              </a:ext>
+            </a:extLst>
+          </p:cNvPr>
+          <p:cNvSpPr>
+            <a:spLocks noGrp="1"/>
+          </p:cNvSpPr>
+          <p:nvPr>
+            <p:ph type="title"/>
+          </p:nvPr>
+        </p:nvSpPr>
+        <p:spPr>
+          <a:xfrm>
+            <a:off x="838200" y="365125"/>
+            <a:ext cx="10515600" cy="979013"/>
+          </a:xfrm>
+        </p:spPr>
+        <p:txBody>
+          <a:bodyPr anchor="ctr">
+            <a:normAutofit/>
+          </a:bodyPr>
+          <a:lstStyle/>
+          <a:p>
+            <a:r>
+              <a:rPr lang="en-US" dirty="0"/>
+              <a:t>Issue Tracker</a:t>
+            </a:r>
+          </a:p>
+        </p:txBody>
+      </p:sp>
+      <p:graphicFrame>
+        <p:nvGraphicFramePr>
+          <p:cNvPr id="6" name="Content Placeholder 2">
+            <a:extLst>
+              <a:ext uri="{FF2B5EF4-FFF2-40B4-BE49-F238E27FC236}">
+                <a16:creationId xmlns:a16="http://schemas.microsoft.com/office/drawing/2014/main" id="{C2BE3807-7F37-6977-F65B-CE9705A1895C}"/>
+              </a:ext>
+            </a:extLst>
+          </p:cNvPr>
+          <p:cNvGraphicFramePr>
+            <a:graphicFrameLocks noGrp="1"/>
+          </p:cNvGraphicFramePr>
+          <p:nvPr>
+            <p:ph type="chart" sz="quarter" idx="10"/>
+            <p:extLst>
+              <p:ext uri="{D42A27DB-BD31-4B8C-83A1-F6EECF244321}">
+                <p14:modId xmlns:p14="http://schemas.microsoft.com/office/powerpoint/2010/main" val="1496873640"/>
+              </p:ext>
+            </p:extLst>
+          </p:nvPr>
+        </p:nvGraphicFramePr>
+        <p:xfrm>
+          <a:off x="838200" y="1344138"/>
+          <a:ext cx="10755086" cy="5148737"/>
+        </p:xfrm>
+        <a:graphic>
+          <a:graphicData uri="http://schemas.openxmlformats.org/drawingml/2006/diagram">
+            <dgm:relIds xmlns:dgm="http://schemas.openxmlformats.org/drawingml/2006/diagram" xmlns:r="http://schemas.openxmlformats.org/officeDocument/2006/relationships" r:dm="rId2" r:lo="rId3" r:qs="rId4" r:cs="rId5"/>
+          </a:graphicData>
+        </a:graphic>
+      </p:graphicFrame>
+      <p:sp>
+        <p:nvSpPr>
+          <p:cNvPr id="4" name="Slide Number Placeholder 3" hidden="1">
+            <a:extLst>
+              <a:ext uri="{FF2B5EF4-FFF2-40B4-BE49-F238E27FC236}">
+                <a16:creationId xmlns:a16="http://schemas.microsoft.com/office/drawing/2014/main" id="{6B9F9F31-DD16-EE49-AB3F-5727466AFEC3}"/>
+              </a:ext>
+            </a:extLst>
+          </p:cNvPr>
+          <p:cNvSpPr>
+            <a:spLocks noGrp="1"/>
+          </p:cNvSpPr>
+          <p:nvPr>
+            <p:ph type="sldNum" sz="quarter" idx="4294967295"/>
+          </p:nvPr>
+        </p:nvSpPr>
+        <p:spPr>
+          <a:xfrm>
+            <a:off x="9652000" y="6553200"/>
+            <a:ext cx="2540000" cy="304800"/>
+          </a:xfrm>
+          <a:prstGeom prst="rect">
+            <a:avLst/>
+          </a:prstGeom>
+        </p:spPr>
+        <p:txBody>
+          <a:bodyPr/>
+          <a:lstStyle/>
+          <a:p>
+            <a:pPr>
+              <a:spcAft>
+                <a:spcPts val="600"/>
+              </a:spcAft>
+              <a:defRPr/>
+            </a:pPr>
+            <a:fld id="{3464530E-D695-45C9-AFB6-E411BBE0972A}" type="slidenum">
+              <a:rPr lang="en-US" smtClean="0"/>
+              <a:pPr>
+                <a:spcAft>
+                  <a:spcPts val="600"/>
+                </a:spcAft>
+                <a:defRPr/>
+              </a:pPr>
+              <a:t>10</a:t>
+            </a:fld>
+            <a:endParaRPr lang="en-US"/>
+          </a:p>
+        </p:txBody>
+      </p:sp>
+    </p:spTree>
+    <p:extLst>
+      <p:ext uri="{BB962C8B-B14F-4D97-AF65-F5344CB8AC3E}">
+        <p14:creationId xmlns:p14="http://schemas.microsoft.com/office/powerpoint/2010/main" val="3826586404"/>
+      </p:ext>
+    </p:extLst>
+  </p:cSld>
+  <p:clrMapOvr>
+    <a:masterClrMapping/>
+  </p:clrMapOvr>
+</p:sld>
+</file>
+
+<file path=ppt/slides/slide11.xml><?xml version="1.0" encoding="utf-8"?>
+<p:sld xmlns:a="http://schemas.openxmlformats.org/drawingml/2006/main" xmlns:r="http://schemas.openxmlformats.org/officeDocument/2006/relationships" xmlns:p="http://schemas.openxmlformats.org/presentationml/2006/main">
+  <p:cSld>
+    <p:spTree>
+      <p:nvGrpSpPr>
+        <p:cNvPr id="1" name=""/>
+        <p:cNvGrpSpPr/>
+        <p:nvPr/>
+      </p:nvGrpSpPr>
+      <p:grpSpPr>
+        <a:xfrm>
+          <a:off x="0" y="0"/>
+          <a:ext cx="0" cy="0"/>
+          <a:chOff x="0" y="0"/>
+          <a:chExt cx="0" cy="0"/>
+        </a:xfrm>
+      </p:grpSpPr>
+      <p:sp>
+        <p:nvSpPr>
+          <p:cNvPr id="2" name="Title 1">
+            <a:extLst>
+              <a:ext uri="{FF2B5EF4-FFF2-40B4-BE49-F238E27FC236}">
                 <a16:creationId xmlns:a16="http://schemas.microsoft.com/office/drawing/2014/main" id="{AEC96E5E-A920-A64D-84AF-0C8D424CB46A}"/>
               </a:ext>
             </a:extLst>
@@ -45794,7 +45940,7 @@
                 </a:spcAft>
                 <a:defRPr/>
               </a:pPr>
-              <a:t>10</a:t>
+              <a:t>11</a:t>
             </a:fld>
             <a:endParaRPr lang="en-US"/>
           </a:p>
@@ -45813,7 +45959,7 @@
 </p:sld>
 </file>
 
-<file path=ppt/slides/slide11.xml><?xml version="1.0" encoding="utf-8"?>
+<file path=ppt/slides/slide12.xml><?xml version="1.0" encoding="utf-8"?>
 <p:sld xmlns:a="http://schemas.openxmlformats.org/drawingml/2006/main" xmlns:r="http://schemas.openxmlformats.org/officeDocument/2006/relationships" xmlns:p="http://schemas.openxmlformats.org/presentationml/2006/main">
   <p:cSld>
     <p:spTree>
@@ -45939,7 +46085,7 @@
                 </a:spcAft>
                 <a:defRPr/>
               </a:pPr>
-              <a:t>11</a:t>
+              <a:t>12</a:t>
             </a:fld>
             <a:endParaRPr lang="en-US"/>
           </a:p>
@@ -45958,7 +46104,7 @@
 </p:sld>
 </file>
 
-<file path=ppt/slides/slide12.xml><?xml version="1.0" encoding="utf-8"?>
+<file path=ppt/slides/slide13.xml><?xml version="1.0" encoding="utf-8"?>
 <p:sld xmlns:a="http://schemas.openxmlformats.org/drawingml/2006/main" xmlns:r="http://schemas.openxmlformats.org/officeDocument/2006/relationships" xmlns:p="http://schemas.openxmlformats.org/presentationml/2006/main">
   <p:cSld>
     <p:spTree>
@@ -46084,7 +46230,7 @@
                 </a:spcAft>
                 <a:defRPr/>
               </a:pPr>
-              <a:t>12</a:t>
+              <a:t>13</a:t>
             </a:fld>
             <a:endParaRPr lang="en-US"/>
           </a:p>
@@ -46103,7 +46249,7 @@
 </p:sld>
 </file>
 
-<file path=ppt/slides/slide13.xml><?xml version="1.0" encoding="utf-8"?>
+<file path=ppt/slides/slide14.xml><?xml version="1.0" encoding="utf-8"?>
 <p:sld xmlns:a="http://schemas.openxmlformats.org/drawingml/2006/main" xmlns:r="http://schemas.openxmlformats.org/officeDocument/2006/relationships" xmlns:p="http://schemas.openxmlformats.org/presentationml/2006/main">
   <p:cSld>
     <p:spTree>
@@ -46229,7 +46375,7 @@
                 </a:spcAft>
                 <a:defRPr/>
               </a:pPr>
-              <a:t>13</a:t>
+              <a:t>14</a:t>
             </a:fld>
             <a:endParaRPr lang="en-US"/>
           </a:p>
@@ -46248,7 +46394,7 @@
 </p:sld>
 </file>
 
-<file path=ppt/slides/slide14.xml><?xml version="1.0" encoding="utf-8"?>
+<file path=ppt/slides/slide15.xml><?xml version="1.0" encoding="utf-8"?>
 <p:sld xmlns:a="http://schemas.openxmlformats.org/drawingml/2006/main" xmlns:r="http://schemas.openxmlformats.org/officeDocument/2006/relationships" xmlns:p="http://schemas.openxmlformats.org/presentationml/2006/main">
   <p:cSld>
     <p:spTree>
@@ -46366,7 +46512,7 @@
               <a:pPr>
                 <a:defRPr/>
               </a:pPr>
-              <a:t>14</a:t>
+              <a:t>15</a:t>
             </a:fld>
             <a:endParaRPr lang="en-US"/>
           </a:p>
@@ -46415,7 +46561,7 @@
 </p:sld>
 </file>
 
-<file path=ppt/slides/slide15.xml><?xml version="1.0" encoding="utf-8"?>
+<file path=ppt/slides/slide16.xml><?xml version="1.0" encoding="utf-8"?>
 <p:sld xmlns:a="http://schemas.openxmlformats.org/drawingml/2006/main" xmlns:r="http://schemas.openxmlformats.org/officeDocument/2006/relationships" xmlns:p="http://schemas.openxmlformats.org/presentationml/2006/main">
   <p:cSld>
     <p:spTree>
@@ -46572,7 +46718,7 @@
                 </a:spcAft>
                 <a:defRPr/>
               </a:pPr>
-              <a:t>15</a:t>
+              <a:t>16</a:t>
             </a:fld>
             <a:endParaRPr lang="en-US"/>
           </a:p>
@@ -46634,7 +46780,7 @@
 </p:sld>
 </file>
 
-<file path=ppt/slides/slide16.xml><?xml version="1.0" encoding="utf-8"?>
+<file path=ppt/slides/slide17.xml><?xml version="1.0" encoding="utf-8"?>
 <p:sld xmlns:a="http://schemas.openxmlformats.org/drawingml/2006/main" xmlns:r="http://schemas.openxmlformats.org/officeDocument/2006/relationships" xmlns:p="http://schemas.openxmlformats.org/presentationml/2006/main">
   <p:cSld>
     <p:spTree>
@@ -46791,7 +46937,7 @@
               <a:pPr>
                 <a:defRPr/>
               </a:pPr>
-              <a:t>16</a:t>
+              <a:t>17</a:t>
             </a:fld>
             <a:endParaRPr lang="en-US"/>
           </a:p>
@@ -46810,7 +46956,7 @@
 </p:sld>
 </file>
 
-<file path=ppt/slides/slide17.xml><?xml version="1.0" encoding="utf-8"?>
+<file path=ppt/slides/slide18.xml><?xml version="1.0" encoding="utf-8"?>
 <p:sld xmlns:a="http://schemas.openxmlformats.org/drawingml/2006/main" xmlns:r="http://schemas.openxmlformats.org/officeDocument/2006/relationships" xmlns:p="http://schemas.openxmlformats.org/presentationml/2006/main">
   <p:cSld>
     <p:spTree>
@@ -46955,7 +47101,7 @@
               <a:pPr>
                 <a:defRPr/>
               </a:pPr>
-              <a:t>17</a:t>
+              <a:t>18</a:t>
             </a:fld>
             <a:endParaRPr lang="en-US"/>
           </a:p>
@@ -47039,7 +47185,7 @@
 </p:sld>
 </file>
 
-<file path=ppt/slides/slide18.xml><?xml version="1.0" encoding="utf-8"?>
+<file path=ppt/slides/slide19.xml><?xml version="1.0" encoding="utf-8"?>
 <p:sld xmlns:a="http://schemas.openxmlformats.org/drawingml/2006/main" xmlns:r="http://schemas.openxmlformats.org/officeDocument/2006/relationships" xmlns:p="http://schemas.openxmlformats.org/presentationml/2006/main">
   <p:cSld>
     <p:spTree>
@@ -47202,7 +47348,7 @@
               <a:pPr>
                 <a:defRPr/>
               </a:pPr>
-              <a:t>18</a:t>
+              <a:t>19</a:t>
             </a:fld>
             <a:endParaRPr lang="en-US"/>
           </a:p>
@@ -47221,7 +47367,129 @@
 </p:sld>
 </file>
 
-<file path=ppt/slides/slide19.xml><?xml version="1.0" encoding="utf-8"?>
+<file path=ppt/slides/slide2.xml><?xml version="1.0" encoding="utf-8"?>
+<p:sld xmlns:a="http://schemas.openxmlformats.org/drawingml/2006/main" xmlns:r="http://schemas.openxmlformats.org/officeDocument/2006/relationships" xmlns:p="http://schemas.openxmlformats.org/presentationml/2006/main">
+  <p:cSld>
+    <p:spTree>
+      <p:nvGrpSpPr>
+        <p:cNvPr id="1" name=""/>
+        <p:cNvGrpSpPr/>
+        <p:nvPr/>
+      </p:nvGrpSpPr>
+      <p:grpSpPr>
+        <a:xfrm>
+          <a:off x="0" y="0"/>
+          <a:ext cx="0" cy="0"/>
+          <a:chOff x="0" y="0"/>
+          <a:chExt cx="0" cy="0"/>
+        </a:xfrm>
+      </p:grpSpPr>
+      <p:sp>
+        <p:nvSpPr>
+          <p:cNvPr id="2" name="Content Placeholder 1">
+            <a:extLst>
+              <a:ext uri="{FF2B5EF4-FFF2-40B4-BE49-F238E27FC236}">
+                <a16:creationId xmlns:a16="http://schemas.microsoft.com/office/drawing/2014/main" id="{5EF8B806-6FEC-890E-00B2-F843DA42A880}"/>
+              </a:ext>
+            </a:extLst>
+          </p:cNvPr>
+          <p:cNvSpPr>
+            <a:spLocks noGrp="1"/>
+          </p:cNvSpPr>
+          <p:nvPr>
+            <p:ph idx="1"/>
+          </p:nvPr>
+        </p:nvSpPr>
+        <p:spPr/>
+        <p:txBody>
+          <a:bodyPr/>
+          <a:lstStyle/>
+          <a:p>
+            <a:r>
+              <a:rPr lang="en-US" dirty="0"/>
+              <a:t>A3: Review your colleague’s code!</a:t>
+            </a:r>
+          </a:p>
+          <a:p>
+            <a:endParaRPr lang="en-US" dirty="0"/>
+          </a:p>
+          <a:p>
+            <a:r>
+              <a:rPr lang="en-US" dirty="0"/>
+              <a:t>P2: You have one more paper to read</a:t>
+            </a:r>
+          </a:p>
+          <a:p>
+            <a:endParaRPr lang="en-US" dirty="0"/>
+          </a:p>
+          <a:p>
+            <a:r>
+              <a:rPr lang="en-US" dirty="0"/>
+              <a:t>A4: Starting today</a:t>
+            </a:r>
+          </a:p>
+          <a:p>
+            <a:endParaRPr lang="en-US" dirty="0"/>
+          </a:p>
+          <a:p>
+            <a:r>
+              <a:rPr lang="en-US" dirty="0"/>
+              <a:t>ST1: Answers on GitHub</a:t>
+            </a:r>
+          </a:p>
+          <a:p>
+            <a:endParaRPr lang="en-US" dirty="0"/>
+          </a:p>
+          <a:p>
+            <a:r>
+              <a:rPr lang="en-US" dirty="0"/>
+              <a:t>P1: Which group will present? I will randomly select.</a:t>
+            </a:r>
+          </a:p>
+        </p:txBody>
+      </p:sp>
+      <p:sp>
+        <p:nvSpPr>
+          <p:cNvPr id="3" name="Title 2">
+            <a:extLst>
+              <a:ext uri="{FF2B5EF4-FFF2-40B4-BE49-F238E27FC236}">
+                <a16:creationId xmlns:a16="http://schemas.microsoft.com/office/drawing/2014/main" id="{99544305-3DB6-ED6B-1300-133053B2B362}"/>
+              </a:ext>
+            </a:extLst>
+          </p:cNvPr>
+          <p:cNvSpPr>
+            <a:spLocks noGrp="1"/>
+          </p:cNvSpPr>
+          <p:nvPr>
+            <p:ph type="title"/>
+          </p:nvPr>
+        </p:nvSpPr>
+        <p:spPr/>
+        <p:txBody>
+          <a:bodyPr/>
+          <a:lstStyle/>
+          <a:p>
+            <a:r>
+              <a:rPr lang="en-US" dirty="0"/>
+              <a:t>Starting…</a:t>
+            </a:r>
+          </a:p>
+        </p:txBody>
+      </p:sp>
+    </p:spTree>
+    <p:extLst>
+      <p:ext uri="{BB962C8B-B14F-4D97-AF65-F5344CB8AC3E}">
+        <p14:creationId xmlns:p14="http://schemas.microsoft.com/office/powerpoint/2010/main" val="656044122"/>
+      </p:ext>
+    </p:extLst>
+  </p:cSld>
+  <p:clrMapOvr>
+    <a:masterClrMapping/>
+  </p:clrMapOvr>
+</p:sld>
+</file>
+
+<file path=ppt/slides/slide20.xml><?xml version="1.0" encoding="utf-8"?>
 <p:sld xmlns:a="http://schemas.openxmlformats.org/drawingml/2006/main" xmlns:r="http://schemas.openxmlformats.org/officeDocument/2006/relationships" xmlns:p="http://schemas.openxmlformats.org/presentationml/2006/main">
   <p:cSld>
     <p:spTree>
@@ -47347,7 +47615,7 @@
                 </a:spcAft>
                 <a:defRPr/>
               </a:pPr>
-              <a:t>19</a:t>
+              <a:t>20</a:t>
             </a:fld>
             <a:endParaRPr lang="en-US"/>
           </a:p>
@@ -47366,120 +47634,7 @@
 </p:sld>
 </file>
 
-<file path=ppt/slides/slide2.xml><?xml version="1.0" encoding="utf-8"?>
-<p:sld xmlns:a="http://schemas.openxmlformats.org/drawingml/2006/main" xmlns:r="http://schemas.openxmlformats.org/officeDocument/2006/relationships" xmlns:p="http://schemas.openxmlformats.org/presentationml/2006/main">
-  <p:cSld>
-    <p:spTree>
-      <p:nvGrpSpPr>
-        <p:cNvPr id="1" name=""/>
-        <p:cNvGrpSpPr/>
-        <p:nvPr/>
-      </p:nvGrpSpPr>
-      <p:grpSpPr>
-        <a:xfrm>
-          <a:off x="0" y="0"/>
-          <a:ext cx="0" cy="0"/>
-          <a:chOff x="0" y="0"/>
-          <a:chExt cx="0" cy="0"/>
-        </a:xfrm>
-      </p:grpSpPr>
-      <p:sp>
-        <p:nvSpPr>
-          <p:cNvPr id="2" name="Content Placeholder 1">
-            <a:extLst>
-              <a:ext uri="{FF2B5EF4-FFF2-40B4-BE49-F238E27FC236}">
-                <a16:creationId xmlns:a16="http://schemas.microsoft.com/office/drawing/2014/main" id="{5EF8B806-6FEC-890E-00B2-F843DA42A880}"/>
-              </a:ext>
-            </a:extLst>
-          </p:cNvPr>
-          <p:cNvSpPr>
-            <a:spLocks noGrp="1"/>
-          </p:cNvSpPr>
-          <p:nvPr>
-            <p:ph idx="1"/>
-          </p:nvPr>
-        </p:nvSpPr>
-        <p:spPr/>
-        <p:txBody>
-          <a:bodyPr/>
-          <a:lstStyle/>
-          <a:p>
-            <a:r>
-              <a:rPr lang="en-US" dirty="0"/>
-              <a:t>A3: Review your colleague’s code!</a:t>
-            </a:r>
-          </a:p>
-          <a:p>
-            <a:endParaRPr lang="en-US" dirty="0"/>
-          </a:p>
-          <a:p>
-            <a:r>
-              <a:rPr lang="en-US" dirty="0"/>
-              <a:t>P2: You have one more paper to read</a:t>
-            </a:r>
-          </a:p>
-          <a:p>
-            <a:endParaRPr lang="en-US" dirty="0"/>
-          </a:p>
-          <a:p>
-            <a:r>
-              <a:rPr lang="en-US" dirty="0"/>
-              <a:t>A4: Starting today</a:t>
-            </a:r>
-          </a:p>
-          <a:p>
-            <a:endParaRPr lang="en-US" dirty="0"/>
-          </a:p>
-          <a:p>
-            <a:r>
-              <a:rPr lang="en-US" dirty="0"/>
-              <a:t>P1: Which group will present? I will randomly select.</a:t>
-            </a:r>
-          </a:p>
-        </p:txBody>
-      </p:sp>
-      <p:sp>
-        <p:nvSpPr>
-          <p:cNvPr id="3" name="Title 2">
-            <a:extLst>
-              <a:ext uri="{FF2B5EF4-FFF2-40B4-BE49-F238E27FC236}">
-                <a16:creationId xmlns:a16="http://schemas.microsoft.com/office/drawing/2014/main" id="{99544305-3DB6-ED6B-1300-133053B2B362}"/>
-              </a:ext>
-            </a:extLst>
-          </p:cNvPr>
-          <p:cNvSpPr>
-            <a:spLocks noGrp="1"/>
-          </p:cNvSpPr>
-          <p:nvPr>
-            <p:ph type="title"/>
-          </p:nvPr>
-        </p:nvSpPr>
-        <p:spPr/>
-        <p:txBody>
-          <a:bodyPr/>
-          <a:lstStyle/>
-          <a:p>
-            <a:r>
-              <a:rPr lang="en-US" dirty="0"/>
-              <a:t>Starting…</a:t>
-            </a:r>
-          </a:p>
-        </p:txBody>
-      </p:sp>
-    </p:spTree>
-    <p:extLst>
-      <p:ext uri="{BB962C8B-B14F-4D97-AF65-F5344CB8AC3E}">
-        <p14:creationId xmlns:p14="http://schemas.microsoft.com/office/powerpoint/2010/main" val="656044122"/>
-      </p:ext>
-    </p:extLst>
-  </p:cSld>
-  <p:clrMapOvr>
-    <a:masterClrMapping/>
-  </p:clrMapOvr>
-</p:sld>
-</file>
-
-<file path=ppt/slides/slide20.xml><?xml version="1.0" encoding="utf-8"?>
+<file path=ppt/slides/slide21.xml><?xml version="1.0" encoding="utf-8"?>
 <p:sld xmlns:a="http://schemas.openxmlformats.org/drawingml/2006/main" xmlns:r="http://schemas.openxmlformats.org/officeDocument/2006/relationships" xmlns:p="http://schemas.openxmlformats.org/presentationml/2006/main">
   <p:cSld>
     <p:spTree>
@@ -47605,7 +47760,7 @@
                 </a:spcAft>
                 <a:defRPr/>
               </a:pPr>
-              <a:t>20</a:t>
+              <a:t>21</a:t>
             </a:fld>
             <a:endParaRPr lang="en-US"/>
           </a:p>
@@ -47624,7 +47779,7 @@
 </p:sld>
 </file>
 
-<file path=ppt/slides/slide21.xml><?xml version="1.0" encoding="utf-8"?>
+<file path=ppt/slides/slide22.xml><?xml version="1.0" encoding="utf-8"?>
 <p:sld xmlns:a="http://schemas.openxmlformats.org/drawingml/2006/main" xmlns:r="http://schemas.openxmlformats.org/officeDocument/2006/relationships" xmlns:p="http://schemas.openxmlformats.org/presentationml/2006/main">
   <p:cSld>
     <p:spTree>
@@ -47750,7 +47905,7 @@
                 </a:spcAft>
                 <a:defRPr/>
               </a:pPr>
-              <a:t>21</a:t>
+              <a:t>22</a:t>
             </a:fld>
             <a:endParaRPr lang="en-US"/>
           </a:p>
@@ -47769,7 +47924,7 @@
 </p:sld>
 </file>
 
-<file path=ppt/slides/slide22.xml><?xml version="1.0" encoding="utf-8"?>
+<file path=ppt/slides/slide23.xml><?xml version="1.0" encoding="utf-8"?>
 <p:sld xmlns:a="http://schemas.openxmlformats.org/drawingml/2006/main" xmlns:r="http://schemas.openxmlformats.org/officeDocument/2006/relationships" xmlns:p="http://schemas.openxmlformats.org/presentationml/2006/main">
   <p:cSld>
     <p:spTree>
@@ -47873,7 +48028,7 @@
               <a:pPr>
                 <a:defRPr/>
               </a:pPr>
-              <a:t>22</a:t>
+              <a:t>23</a:t>
             </a:fld>
             <a:endParaRPr lang="en-US"/>
           </a:p>
@@ -47922,7 +48077,7 @@
 </p:sld>
 </file>
 
-<file path=ppt/slides/slide23.xml><?xml version="1.0" encoding="utf-8"?>
+<file path=ppt/slides/slide24.xml><?xml version="1.0" encoding="utf-8"?>
 <p:sld xmlns:a="http://schemas.openxmlformats.org/drawingml/2006/main" xmlns:r="http://schemas.openxmlformats.org/officeDocument/2006/relationships" xmlns:p="http://schemas.openxmlformats.org/presentationml/2006/main">
   <p:cSld>
     <p:spTree>
@@ -48079,7 +48234,7 @@
               <a:pPr>
                 <a:defRPr/>
               </a:pPr>
-              <a:t>23</a:t>
+              <a:t>24</a:t>
             </a:fld>
             <a:endParaRPr lang="en-US"/>
           </a:p>
@@ -48099,6 +48254,98 @@
 </file>
 
 <file path=ppt/slides/slide3.xml><?xml version="1.0" encoding="utf-8"?>
+<p:sld xmlns:a="http://schemas.openxmlformats.org/drawingml/2006/main" xmlns:r="http://schemas.openxmlformats.org/officeDocument/2006/relationships" xmlns:p="http://schemas.openxmlformats.org/presentationml/2006/main">
+  <p:cSld>
+    <p:spTree>
+      <p:nvGrpSpPr>
+        <p:cNvPr id="1" name=""/>
+        <p:cNvGrpSpPr/>
+        <p:nvPr/>
+      </p:nvGrpSpPr>
+      <p:grpSpPr>
+        <a:xfrm>
+          <a:off x="0" y="0"/>
+          <a:ext cx="0" cy="0"/>
+          <a:chOff x="0" y="0"/>
+          <a:chExt cx="0" cy="0"/>
+        </a:xfrm>
+      </p:grpSpPr>
+      <p:sp>
+        <p:nvSpPr>
+          <p:cNvPr id="2" name="Content Placeholder 1">
+            <a:extLst>
+              <a:ext uri="{FF2B5EF4-FFF2-40B4-BE49-F238E27FC236}">
+                <a16:creationId xmlns:a16="http://schemas.microsoft.com/office/drawing/2014/main" id="{C86EFD1D-76E8-49B9-EAC5-7749E70514C4}"/>
+              </a:ext>
+            </a:extLst>
+          </p:cNvPr>
+          <p:cNvSpPr>
+            <a:spLocks noGrp="1"/>
+          </p:cNvSpPr>
+          <p:nvPr>
+            <p:ph idx="1"/>
+          </p:nvPr>
+        </p:nvSpPr>
+        <p:spPr/>
+        <p:txBody>
+          <a:bodyPr/>
+          <a:lstStyle/>
+          <a:p>
+            <a:endParaRPr lang="en-US" dirty="0"/>
+          </a:p>
+        </p:txBody>
+      </p:sp>
+      <p:sp>
+        <p:nvSpPr>
+          <p:cNvPr id="3" name="Title 2">
+            <a:extLst>
+              <a:ext uri="{FF2B5EF4-FFF2-40B4-BE49-F238E27FC236}">
+                <a16:creationId xmlns:a16="http://schemas.microsoft.com/office/drawing/2014/main" id="{DEA629F4-DDA4-72F2-9230-744A59334BE3}"/>
+              </a:ext>
+            </a:extLst>
+          </p:cNvPr>
+          <p:cNvSpPr>
+            <a:spLocks noGrp="1"/>
+          </p:cNvSpPr>
+          <p:nvPr>
+            <p:ph type="title"/>
+          </p:nvPr>
+        </p:nvSpPr>
+        <p:spPr/>
+        <p:txBody>
+          <a:bodyPr>
+            <a:normAutofit fontScale="90000"/>
+          </a:bodyPr>
+          <a:lstStyle/>
+          <a:p>
+            <a:r>
+              <a:rPr lang="en-US" dirty="0"/>
+              <a:t>POLL: What is important when</a:t>
+            </a:r>
+            <a:br>
+              <a:rPr lang="en-US" dirty="0"/>
+            </a:br>
+            <a:r>
+              <a:rPr lang="en-US" dirty="0"/>
+              <a:t>open-sourcing a project?</a:t>
+            </a:r>
+          </a:p>
+        </p:txBody>
+      </p:sp>
+    </p:spTree>
+    <p:extLst>
+      <p:ext uri="{BB962C8B-B14F-4D97-AF65-F5344CB8AC3E}">
+        <p14:creationId xmlns:p14="http://schemas.microsoft.com/office/powerpoint/2010/main" val="505927273"/>
+      </p:ext>
+    </p:extLst>
+  </p:cSld>
+  <p:clrMapOvr>
+    <a:masterClrMapping/>
+  </p:clrMapOvr>
+</p:sld>
+</file>
+
+<file path=ppt/slides/slide4.xml><?xml version="1.0" encoding="utf-8"?>
 <p:sld xmlns:a="http://schemas.openxmlformats.org/drawingml/2006/main" xmlns:r="http://schemas.openxmlformats.org/officeDocument/2006/relationships" xmlns:p="http://schemas.openxmlformats.org/presentationml/2006/main">
   <p:cSld>
     <p:spTree>
@@ -48194,7 +48441,7 @@
 </p:sld>
 </file>
 
-<file path=ppt/slides/slide4.xml><?xml version="1.0" encoding="utf-8"?>
+<file path=ppt/slides/slide5.xml><?xml version="1.0" encoding="utf-8"?>
 <p:sld xmlns:a="http://schemas.openxmlformats.org/drawingml/2006/main" xmlns:r="http://schemas.openxmlformats.org/officeDocument/2006/relationships" xmlns:p="http://schemas.openxmlformats.org/presentationml/2006/main">
   <p:cSld>
     <p:spTree>
@@ -48438,15 +48685,6 @@
           <a:solidFill>
             <a:srgbClr val="FFFFFF"/>
           </a:solidFill>
-          <a:extLst>
-            <a:ext uri="{909E8E84-426E-40DD-AFC4-6F175D3DCCD1}">
-              <a14:hiddenFill xmlns:a14="http://schemas.microsoft.com/office/drawing/2010/main">
-                <a:solidFill>
-                  <a:srgbClr val="FFFFFF"/>
-                </a:solidFill>
-              </a14:hiddenFill>
-            </a:ext>
-          </a:extLst>
         </p:spPr>
       </p:pic>
       <p:sp>
@@ -48492,7 +48730,7 @@
                 </a:spcAft>
                 <a:defRPr/>
               </a:pPr>
-              <a:t>4</a:t>
+              <a:t>5</a:t>
             </a:fld>
             <a:endParaRPr lang="en-US"/>
           </a:p>
@@ -48511,7 +48749,7 @@
 </p:sld>
 </file>
 
-<file path=ppt/slides/slide5.xml><?xml version="1.0" encoding="utf-8"?>
+<file path=ppt/slides/slide6.xml><?xml version="1.0" encoding="utf-8"?>
 <p:sld xmlns:a="http://schemas.openxmlformats.org/drawingml/2006/main" xmlns:r="http://schemas.openxmlformats.org/officeDocument/2006/relationships" xmlns:p="http://schemas.openxmlformats.org/presentationml/2006/main">
   <p:cSld>
     <p:spTree>
@@ -48637,7 +48875,7 @@
                 </a:spcAft>
                 <a:defRPr/>
               </a:pPr>
-              <a:t>5</a:t>
+              <a:t>6</a:t>
             </a:fld>
             <a:endParaRPr lang="en-US"/>
           </a:p>
@@ -48656,7 +48894,7 @@
 </p:sld>
 </file>
 
-<file path=ppt/slides/slide6.xml><?xml version="1.0" encoding="utf-8"?>
+<file path=ppt/slides/slide7.xml><?xml version="1.0" encoding="utf-8"?>
 <p:sld xmlns:a="http://schemas.openxmlformats.org/drawingml/2006/main" xmlns:r="http://schemas.openxmlformats.org/officeDocument/2006/relationships" xmlns:p="http://schemas.openxmlformats.org/presentationml/2006/main">
   <p:cSld>
     <p:spTree>
@@ -48782,7 +49020,7 @@
                 </a:spcAft>
                 <a:defRPr/>
               </a:pPr>
-              <a:t>6</a:t>
+              <a:t>7</a:t>
             </a:fld>
             <a:endParaRPr lang="en-US"/>
           </a:p>
@@ -48801,7 +49039,7 @@
 </p:sld>
 </file>
 
-<file path=ppt/slides/slide7.xml><?xml version="1.0" encoding="utf-8"?>
+<file path=ppt/slides/slide8.xml><?xml version="1.0" encoding="utf-8"?>
 <p:sld xmlns:a="http://schemas.openxmlformats.org/drawingml/2006/main" xmlns:r="http://schemas.openxmlformats.org/officeDocument/2006/relationships" xmlns:p="http://schemas.openxmlformats.org/presentationml/2006/main">
   <p:cSld>
     <p:spTree>
@@ -48921,7 +49159,7 @@
               <a:pPr>
                 <a:defRPr/>
               </a:pPr>
-              <a:t>7</a:t>
+              <a:t>8</a:t>
             </a:fld>
             <a:endParaRPr lang="en-US"/>
           </a:p>
@@ -48970,7 +49208,7 @@
 </p:sld>
 </file>
 
-<file path=ppt/slides/slide8.xml><?xml version="1.0" encoding="utf-8"?>
+<file path=ppt/slides/slide9.xml><?xml version="1.0" encoding="utf-8"?>
 <p:sld xmlns:a="http://schemas.openxmlformats.org/drawingml/2006/main" xmlns:r="http://schemas.openxmlformats.org/officeDocument/2006/relationships" xmlns:p="http://schemas.openxmlformats.org/presentationml/2006/main">
   <p:cSld>
     <p:spTree>
@@ -49096,7 +49334,7 @@
                 </a:spcAft>
                 <a:defRPr/>
               </a:pPr>
-              <a:t>8</a:t>
+              <a:t>9</a:t>
             </a:fld>
             <a:endParaRPr lang="en-US"/>
           </a:p>
@@ -49162,151 +49400,6 @@
     <p:extLst>
       <p:ext uri="{BB962C8B-B14F-4D97-AF65-F5344CB8AC3E}">
         <p14:creationId xmlns:p14="http://schemas.microsoft.com/office/powerpoint/2010/main" val="1580304124"/>
-      </p:ext>
-    </p:extLst>
-  </p:cSld>
-  <p:clrMapOvr>
-    <a:masterClrMapping/>
-  </p:clrMapOvr>
-</p:sld>
-</file>
-
-<file path=ppt/slides/slide9.xml><?xml version="1.0" encoding="utf-8"?>
-<p:sld xmlns:a="http://schemas.openxmlformats.org/drawingml/2006/main" xmlns:r="http://schemas.openxmlformats.org/officeDocument/2006/relationships" xmlns:p="http://schemas.openxmlformats.org/presentationml/2006/main">
-  <p:cSld>
-    <p:spTree>
-      <p:nvGrpSpPr>
-        <p:cNvPr id="1" name=""/>
-        <p:cNvGrpSpPr/>
-        <p:nvPr/>
-      </p:nvGrpSpPr>
-      <p:grpSpPr>
-        <a:xfrm>
-          <a:off x="0" y="0"/>
-          <a:ext cx="0" cy="0"/>
-          <a:chOff x="0" y="0"/>
-          <a:chExt cx="0" cy="0"/>
-        </a:xfrm>
-      </p:grpSpPr>
-      <p:sp>
-        <p:nvSpPr>
-          <p:cNvPr id="2" name="Title 1">
-            <a:extLst>
-              <a:ext uri="{FF2B5EF4-FFF2-40B4-BE49-F238E27FC236}">
-                <a16:creationId xmlns:a16="http://schemas.microsoft.com/office/drawing/2014/main" id="{E93B121F-724A-4944-8363-D9A4D3591054}"/>
-              </a:ext>
-            </a:extLst>
-          </p:cNvPr>
-          <p:cNvSpPr>
-            <a:spLocks noGrp="1"/>
-          </p:cNvSpPr>
-          <p:nvPr>
-            <p:ph type="title"/>
-          </p:nvPr>
-        </p:nvSpPr>
-        <p:spPr>
-          <a:xfrm>
-            <a:off x="838200" y="365125"/>
-            <a:ext cx="10515600" cy="979013"/>
-          </a:xfrm>
-        </p:spPr>
-        <p:txBody>
-          <a:bodyPr anchor="ctr">
-            <a:normAutofit/>
-          </a:bodyPr>
-          <a:lstStyle/>
-          <a:p>
-            <a:r>
-              <a:rPr lang="en-US" dirty="0"/>
-              <a:t>Issue Tracker</a:t>
-            </a:r>
-          </a:p>
-        </p:txBody>
-      </p:sp>
-      <p:graphicFrame>
-        <p:nvGraphicFramePr>
-          <p:cNvPr id="6" name="Content Placeholder 2">
-            <a:extLst>
-              <a:ext uri="{FF2B5EF4-FFF2-40B4-BE49-F238E27FC236}">
-                <a16:creationId xmlns:a16="http://schemas.microsoft.com/office/drawing/2014/main" id="{C2BE3807-7F37-6977-F65B-CE9705A1895C}"/>
-              </a:ext>
-            </a:extLst>
-          </p:cNvPr>
-          <p:cNvGraphicFramePr>
-            <a:graphicFrameLocks noGrp="1"/>
-          </p:cNvGraphicFramePr>
-          <p:nvPr>
-            <p:ph type="chart" sz="quarter" idx="10"/>
-            <p:extLst>
-              <p:ext uri="{D42A27DB-BD31-4B8C-83A1-F6EECF244321}">
-                <p14:modId xmlns:p14="http://schemas.microsoft.com/office/powerpoint/2010/main" val="1496873640"/>
-              </p:ext>
-            </p:extLst>
-          </p:nvPr>
-        </p:nvGraphicFramePr>
-        <p:xfrm>
-          <a:off x="838200" y="1344138"/>
-          <a:ext cx="10755086" cy="5148737"/>
-        </p:xfrm>
-        <a:graphic>
-          <a:graphicData uri="http://schemas.openxmlformats.org/drawingml/2006/diagram">
-            <dgm:relIds xmlns:dgm="http://schemas.openxmlformats.org/drawingml/2006/diagram" xmlns:r="http://schemas.openxmlformats.org/officeDocument/2006/relationships" r:dm="rId2" r:lo="rId3" r:qs="rId4" r:cs="rId5"/>
-          </a:graphicData>
-        </a:graphic>
-      </p:graphicFrame>
-      <p:sp>
-        <p:nvSpPr>
-          <p:cNvPr id="4" name="Slide Number Placeholder 3" hidden="1">
-            <a:extLst>
-              <a:ext uri="{FF2B5EF4-FFF2-40B4-BE49-F238E27FC236}">
-                <a16:creationId xmlns:a16="http://schemas.microsoft.com/office/drawing/2014/main" id="{6B9F9F31-DD16-EE49-AB3F-5727466AFEC3}"/>
-              </a:ext>
-            </a:extLst>
-          </p:cNvPr>
-          <p:cNvSpPr>
-            <a:spLocks noGrp="1"/>
-          </p:cNvSpPr>
-          <p:nvPr>
-            <p:ph type="sldNum" sz="quarter" idx="4294967295"/>
-          </p:nvPr>
-        </p:nvSpPr>
-        <p:spPr>
-          <a:xfrm>
-            <a:off x="9652000" y="6553200"/>
-            <a:ext cx="2540000" cy="304800"/>
-          </a:xfrm>
-          <a:prstGeom prst="rect">
-            <a:avLst/>
-          </a:prstGeom>
-        </p:spPr>
-        <p:txBody>
-          <a:bodyPr/>
-          <a:lstStyle/>
-          <a:p>
-            <a:pPr>
-              <a:spcAft>
-                <a:spcPts val="600"/>
-              </a:spcAft>
-              <a:defRPr/>
-            </a:pPr>
-            <a:fld id="{3464530E-D695-45C9-AFB6-E411BBE0972A}" type="slidenum">
-              <a:rPr lang="en-US" smtClean="0"/>
-              <a:pPr>
-                <a:spcAft>
-                  <a:spcPts val="600"/>
-                </a:spcAft>
-                <a:defRPr/>
-              </a:pPr>
-              <a:t>9</a:t>
-            </a:fld>
-            <a:endParaRPr lang="en-US"/>
-          </a:p>
-        </p:txBody>
-      </p:sp>
-    </p:spTree>
-    <p:extLst>
-      <p:ext uri="{BB962C8B-B14F-4D97-AF65-F5344CB8AC3E}">
-        <p14:creationId xmlns:p14="http://schemas.microsoft.com/office/powerpoint/2010/main" val="3826586404"/>
       </p:ext>
     </p:extLst>
   </p:cSld>

</xml_diff>